<commit_message>
adding Chapter 2-5 modules
</commit_message>
<xml_diff>
--- a/CS30A - Intro to Unix-Linux/Modules/Chapter 02-What is Unix - What is Linux.pptx
+++ b/CS30A - Intro to Unix-Linux/Modules/Chapter 02-What is Unix - What is Linux.pptx
@@ -138,7 +138,7 @@
   </p:defaultTextStyle>
   <p:extLst>
     <p:ext uri="{EFAFB233-063F-42B5-8137-9DF3F51BA10A}">
-      <p15:sldGuideLst xmlns:p15="http://schemas.microsoft.com/office/powerpoint/2012/main" xmlns="">
+      <p15:sldGuideLst xmlns="" xmlns:p15="http://schemas.microsoft.com/office/powerpoint/2012/main">
         <p15:guide id="1" pos="3840" userDrawn="1">
           <p15:clr>
             <a:srgbClr val="A4A3A4"/>
@@ -152,7 +152,7 @@
       </p15:sldGuideLst>
     </p:ext>
     <p:ext uri="{2D200454-40CA-4A62-9FC3-DE9A4176ACB9}">
-      <p15:notesGuideLst xmlns:p15="http://schemas.microsoft.com/office/powerpoint/2012/main" xmlns=""/>
+      <p15:notesGuideLst xmlns="" xmlns:p15="http://schemas.microsoft.com/office/powerpoint/2012/main"/>
     </p:ext>
   </p:extLst>
 </p:presentation>
@@ -15242,7 +15242,7 @@
           <a:p>
             <a:fld id="{65DD71D7-55AC-46BD-81B3-09AB2F9EFBD8}" type="datetimeFigureOut">
               <a:rPr lang="en-US" smtClean="0"/>
-              <a:t>9/27/2013</a:t>
+              <a:t>7/1/2015</a:t>
             </a:fld>
             <a:endParaRPr lang="en-US" dirty="0"/>
           </a:p>
@@ -15407,7 +15407,7 @@
           <a:p>
             <a:fld id="{1F89424F-BB59-4F4E-9822-4CA3E770FFD2}" type="datetimeFigureOut">
               <a:rPr lang="en-US" smtClean="0"/>
-              <a:t>9/27/2013</a:t>
+              <a:t>7/1/2015</a:t>
             </a:fld>
             <a:endParaRPr lang="en-US" dirty="0"/>
           </a:p>
@@ -16590,7 +16590,7 @@
   </mc:AlternateContent>
   <p:extLst>
     <p:ext uri="{DCECCB84-F9BA-43D5-87BE-67443E8EF086}">
-      <p15:sldGuideLst xmlns:p15="http://schemas.microsoft.com/office/powerpoint/2012/main" xmlns=""/>
+      <p15:sldGuideLst xmlns="" xmlns:p15="http://schemas.microsoft.com/office/powerpoint/2012/main"/>
     </p:ext>
   </p:extLst>
 </p:sldLayout>
@@ -19370,7 +19370,7 @@
   </p:txStyles>
   <p:extLst mod="1">
     <p:ext uri="{27BBF7A9-308A-43DC-89C8-2F10F3537804}">
-      <p15:sldGuideLst xmlns:p15="http://schemas.microsoft.com/office/powerpoint/2012/main" xmlns="">
+      <p15:sldGuideLst xmlns="" xmlns:p15="http://schemas.microsoft.com/office/powerpoint/2012/main">
         <p15:guide id="1" orient="horz" pos="2160" userDrawn="1">
           <p15:clr>
             <a:srgbClr val="F26B43"/>
@@ -19460,27 +19460,7 @@
             <a:pPr fontAlgn="base"/>
             <a:r>
               <a:rPr lang="en-US" sz="1400" b="0" dirty="0"/>
-              <a:t>Hadeel</a:t>
-            </a:r>
-            <a:r>
-              <a:rPr lang="en-US" sz="1400" b="0" dirty="0"/>
-              <a:t> </a:t>
-            </a:r>
-            <a:r>
-              <a:rPr lang="en-US" sz="1400" b="0" dirty="0"/>
-              <a:t>Ammari</a:t>
-            </a:r>
-            <a:r>
-              <a:rPr lang="en-US" sz="1400" b="0" dirty="0"/>
-              <a:t>, </a:t>
-            </a:r>
-            <a:r>
-              <a:rPr lang="en-US" sz="1400" b="0" dirty="0"/>
-              <a:t>M.C.Sc</a:t>
-            </a:r>
-            <a:r>
-              <a:rPr lang="en-US" sz="1400" b="0" dirty="0"/>
-              <a:t>, MBA</a:t>
+              <a:t>Hadeel Ammari, M.C.Sc, MBA</a:t>
             </a:r>
           </a:p>
           <a:p>
@@ -20738,7 +20718,27 @@
                   <a:latin typeface="Calibri" pitchFamily="34" charset="0"/>
                   <a:cs typeface="Calibri" pitchFamily="34" charset="0"/>
                 </a:rPr>
-                <a:t>Unix System Laboratiry (USL)</a:t>
+                <a:t>Unix System </a:t>
+              </a:r>
+              <a:r>
+                <a:rPr lang="en-US" sz="1400" noProof="1" smtClean="0">
+                  <a:solidFill>
+                    <a:srgbClr val="080808"/>
+                  </a:solidFill>
+                  <a:latin typeface="Calibri" pitchFamily="34" charset="0"/>
+                  <a:cs typeface="Calibri" pitchFamily="34" charset="0"/>
+                </a:rPr>
+                <a:t>Laboratory </a:t>
+              </a:r>
+              <a:r>
+                <a:rPr lang="en-US" sz="1400" noProof="1" smtClean="0">
+                  <a:solidFill>
+                    <a:srgbClr val="080808"/>
+                  </a:solidFill>
+                  <a:latin typeface="Calibri" pitchFamily="34" charset="0"/>
+                  <a:cs typeface="Calibri" pitchFamily="34" charset="0"/>
+                </a:rPr>
+                <a:t>(USL)</a:t>
               </a:r>
             </a:p>
           </p:txBody>
@@ -22376,7 +22376,6 @@
               <a:rPr lang="en-GB" sz="2000" dirty="0" smtClean="0"/>
               <a:t>Emacs</a:t>
             </a:r>
-            <a:endParaRPr lang="en-GB" sz="2000" dirty="0" smtClean="0"/>
           </a:p>
           <a:p>
             <a:pPr lvl="2">
@@ -22386,15 +22385,7 @@
             </a:pPr>
             <a:r>
               <a:rPr lang="en-GB" sz="2000" dirty="0" smtClean="0"/>
-              <a:t>C compiler (</a:t>
-            </a:r>
-            <a:r>
-              <a:rPr lang="en-GB" sz="2000" dirty="0" smtClean="0"/>
-              <a:t>gcc</a:t>
-            </a:r>
-            <a:r>
-              <a:rPr lang="en-GB" sz="2000" dirty="0" smtClean="0"/>
-              <a:t>)</a:t>
+              <a:t>C compiler (gcc)</a:t>
             </a:r>
           </a:p>
           <a:p>
@@ -22416,15 +22407,7 @@
             </a:pPr>
             <a:r>
               <a:rPr lang="en-GB" sz="2000" dirty="0" smtClean="0"/>
-              <a:t>Powerful debugger (</a:t>
-            </a:r>
-            <a:r>
-              <a:rPr lang="en-GB" sz="2000" dirty="0" smtClean="0"/>
-              <a:t>gdb</a:t>
-            </a:r>
-            <a:r>
-              <a:rPr lang="en-GB" sz="2000" dirty="0" smtClean="0"/>
-              <a:t>)</a:t>
+              <a:t>Powerful debugger (gdb)</a:t>
             </a:r>
           </a:p>
           <a:p>
@@ -25056,9 +25039,9 @@
         <p:grpSpPr>
           <a:xfrm>
             <a:off x="551451" y="4637494"/>
-            <a:ext cx="2610307" cy="1435763"/>
+            <a:ext cx="2610307" cy="1264173"/>
             <a:chOff x="84339" y="1264755"/>
-            <a:chExt cx="1531053" cy="2109186"/>
+            <a:chExt cx="1531053" cy="1857115"/>
           </a:xfrm>
         </p:grpSpPr>
         <p:sp>
@@ -25123,7 +25106,7 @@
           <p:spPr bwMode="auto">
             <a:xfrm>
               <a:off x="90785" y="1299527"/>
-              <a:ext cx="1524607" cy="2074414"/>
+              <a:ext cx="1524607" cy="1781411"/>
             </a:xfrm>
             <a:prstGeom prst="rect">
               <a:avLst/>
@@ -25155,7 +25138,27 @@
                   <a:latin typeface="Calibri" pitchFamily="34" charset="0"/>
                   <a:cs typeface="Calibri" pitchFamily="34" charset="0"/>
                 </a:rPr>
-                <a:t>Ken Thomson delievered first paper on Unix at a conference of computer professionals.</a:t>
+                <a:t>Ken Thomson </a:t>
+              </a:r>
+              <a:r>
+                <a:rPr lang="en-US" sz="1400" noProof="1" smtClean="0">
+                  <a:solidFill>
+                    <a:srgbClr val="080808"/>
+                  </a:solidFill>
+                  <a:latin typeface="Calibri" pitchFamily="34" charset="0"/>
+                  <a:cs typeface="Calibri" pitchFamily="34" charset="0"/>
+                </a:rPr>
+                <a:t>delivered </a:t>
+              </a:r>
+              <a:r>
+                <a:rPr lang="en-US" sz="1400" noProof="1" smtClean="0">
+                  <a:solidFill>
+                    <a:srgbClr val="080808"/>
+                  </a:solidFill>
+                  <a:latin typeface="Calibri" pitchFamily="34" charset="0"/>
+                  <a:cs typeface="Calibri" pitchFamily="34" charset="0"/>
+                </a:rPr>
+                <a:t>first paper on Unix at a conference of computer professionals.</a:t>
               </a:r>
             </a:p>
             <a:p>
@@ -25303,7 +25306,27 @@
                   <a:latin typeface="Calibri" pitchFamily="34" charset="0"/>
                   <a:cs typeface="Calibri" pitchFamily="34" charset="0"/>
                 </a:rPr>
-                <a:t>AT&amp;T starte licensin UNIX to universities.</a:t>
+                <a:t>AT&amp;T </a:t>
+              </a:r>
+              <a:r>
+                <a:rPr lang="en-US" sz="1400" noProof="1" smtClean="0">
+                  <a:solidFill>
+                    <a:srgbClr val="080808"/>
+                  </a:solidFill>
+                  <a:latin typeface="Calibri" pitchFamily="34" charset="0"/>
+                  <a:cs typeface="Calibri" pitchFamily="34" charset="0"/>
+                </a:rPr>
+                <a:t>started licensing </a:t>
+              </a:r>
+              <a:r>
+                <a:rPr lang="en-US" sz="1400" noProof="1" smtClean="0">
+                  <a:solidFill>
+                    <a:srgbClr val="080808"/>
+                  </a:solidFill>
+                  <a:latin typeface="Calibri" pitchFamily="34" charset="0"/>
+                  <a:cs typeface="Calibri" pitchFamily="34" charset="0"/>
+                </a:rPr>
+                <a:t>UNIX to universities.</a:t>
               </a:r>
               <a:endParaRPr lang="en-US" sz="1400" noProof="1">
                 <a:solidFill>
@@ -25698,7 +25721,27 @@
                   <a:latin typeface="Calibri" pitchFamily="34" charset="0"/>
                   <a:cs typeface="Calibri" pitchFamily="34" charset="0"/>
                 </a:rPr>
-                <a:t>Bill Joy, a Berkeley graduate student, became interested in UNIX and influnced it significently and created many important software </a:t>
+                <a:t>Bill Joy, a Berkeley graduate student, became interested in UNIX and </a:t>
+              </a:r>
+              <a:r>
+                <a:rPr lang="en-US" sz="1400" noProof="1" smtClean="0">
+                  <a:solidFill>
+                    <a:srgbClr val="080808"/>
+                  </a:solidFill>
+                  <a:latin typeface="Calibri" pitchFamily="34" charset="0"/>
+                  <a:cs typeface="Calibri" pitchFamily="34" charset="0"/>
+                </a:rPr>
+                <a:t>influenced it significantly </a:t>
+              </a:r>
+              <a:r>
+                <a:rPr lang="en-US" sz="1400" noProof="1" smtClean="0">
+                  <a:solidFill>
+                    <a:srgbClr val="080808"/>
+                  </a:solidFill>
+                  <a:latin typeface="Calibri" pitchFamily="34" charset="0"/>
+                  <a:cs typeface="Calibri" pitchFamily="34" charset="0"/>
+                </a:rPr>
+                <a:t>and created many important software </a:t>
               </a:r>
               <a:endParaRPr lang="en-US" sz="1400" noProof="1">
                 <a:solidFill>
@@ -26749,9 +26792,9 @@
         <p:grpSpPr>
           <a:xfrm>
             <a:off x="9535128" y="1671578"/>
-            <a:ext cx="2230303" cy="1648301"/>
+            <a:ext cx="2230303" cy="1520340"/>
             <a:chOff x="84339" y="1250887"/>
-            <a:chExt cx="1531053" cy="1675037"/>
+            <a:chExt cx="1531053" cy="1545000"/>
           </a:xfrm>
         </p:grpSpPr>
         <p:sp>
@@ -26816,7 +26859,7 @@
           <p:spPr bwMode="auto">
             <a:xfrm>
               <a:off x="90785" y="1299527"/>
-              <a:ext cx="1524607" cy="1626397"/>
+              <a:ext cx="1524607" cy="1407460"/>
             </a:xfrm>
             <a:prstGeom prst="rect">
               <a:avLst/>
@@ -26848,7 +26891,27 @@
                   <a:latin typeface="Calibri" pitchFamily="34" charset="0"/>
                   <a:cs typeface="Calibri" pitchFamily="34" charset="0"/>
                 </a:rPr>
-                <a:t>AT&amp;T announceed that they will be selling UNIX as a commercial product. First commercial version is System III replaced by System V</a:t>
+                <a:t>AT&amp;T </a:t>
+              </a:r>
+              <a:r>
+                <a:rPr lang="en-US" sz="1400" noProof="1" smtClean="0">
+                  <a:solidFill>
+                    <a:srgbClr val="080808"/>
+                  </a:solidFill>
+                  <a:latin typeface="Calibri" pitchFamily="34" charset="0"/>
+                  <a:cs typeface="Calibri" pitchFamily="34" charset="0"/>
+                </a:rPr>
+                <a:t>announced </a:t>
+              </a:r>
+              <a:r>
+                <a:rPr lang="en-US" sz="1400" noProof="1" smtClean="0">
+                  <a:solidFill>
+                    <a:srgbClr val="080808"/>
+                  </a:solidFill>
+                  <a:latin typeface="Calibri" pitchFamily="34" charset="0"/>
+                  <a:cs typeface="Calibri" pitchFamily="34" charset="0"/>
+                </a:rPr>
+                <a:t>that they will be selling UNIX as a commercial product. First commercial version is System III replaced by System V</a:t>
               </a:r>
               <a:endParaRPr lang="en-US" sz="1400" noProof="1">
                 <a:solidFill>
@@ -30119,19 +30182,7 @@
               <a:rPr lang="en-US" sz="1600" dirty="0">
                 <a:latin typeface="Baskerville Old Face" panose="02020602080505020303" pitchFamily="18" charset="0"/>
               </a:rPr>
-              <a:t>Hello everybody out there using </a:t>
-            </a:r>
-            <a:r>
-              <a:rPr lang="en-US" sz="1600" dirty="0">
-                <a:latin typeface="Baskerville Old Face" panose="02020602080505020303" pitchFamily="18" charset="0"/>
-              </a:rPr>
-              <a:t>minix</a:t>
-            </a:r>
-            <a:r>
-              <a:rPr lang="en-US" sz="1600" dirty="0">
-                <a:latin typeface="Baskerville Old Face" panose="02020602080505020303" pitchFamily="18" charset="0"/>
-              </a:rPr>
-              <a:t> </a:t>
+              <a:t>Hello everybody out there using minix </a:t>
             </a:r>
             <a:r>
               <a:rPr lang="en-US" sz="1600" dirty="0" smtClean="0">
@@ -30206,19 +30257,7 @@
               <a:rPr lang="en-US" sz="1600" dirty="0">
                 <a:latin typeface="Baskerville Old Face" panose="02020602080505020303" pitchFamily="18" charset="0"/>
               </a:rPr>
-              <a:t>people like/dislike in </a:t>
-            </a:r>
-            <a:r>
-              <a:rPr lang="en-US" sz="1600" dirty="0">
-                <a:latin typeface="Baskerville Old Face" panose="02020602080505020303" pitchFamily="18" charset="0"/>
-              </a:rPr>
-              <a:t>minix</a:t>
-            </a:r>
-            <a:r>
-              <a:rPr lang="en-US" sz="1600" dirty="0">
-                <a:latin typeface="Baskerville Old Face" panose="02020602080505020303" pitchFamily="18" charset="0"/>
-              </a:rPr>
-              <a:t>, as my OS resembles it somewhat</a:t>
+              <a:t>people like/dislike in minix, as my OS resembles it somewhat</a:t>
             </a:r>
             <a:br>
               <a:rPr lang="en-US" sz="1600" dirty="0">
@@ -30262,19 +30301,7 @@
               <a:rPr lang="en-US" sz="1600" dirty="0">
                 <a:latin typeface="Baskerville Old Face" panose="02020602080505020303" pitchFamily="18" charset="0"/>
               </a:rPr>
-              <a:t>I've currently ported bash(1.08) and </a:t>
-            </a:r>
-            <a:r>
-              <a:rPr lang="en-US" sz="1600" dirty="0">
-                <a:latin typeface="Baskerville Old Face" panose="02020602080505020303" pitchFamily="18" charset="0"/>
-              </a:rPr>
-              <a:t>gcc</a:t>
-            </a:r>
-            <a:r>
-              <a:rPr lang="en-US" sz="1600" dirty="0">
-                <a:latin typeface="Baskerville Old Face" panose="02020602080505020303" pitchFamily="18" charset="0"/>
-              </a:rPr>
-              <a:t>(1.40), and things seem to work. </a:t>
+              <a:t>I've currently ported bash(1.08) and gcc(1.40), and things seem to work. </a:t>
             </a:r>
             <a:br>
               <a:rPr lang="en-US" sz="1600" dirty="0">
@@ -30339,31 +30366,7 @@
               <a:rPr lang="en-US" sz="1600" dirty="0">
                 <a:latin typeface="Baskerville Old Face" panose="02020602080505020303" pitchFamily="18" charset="0"/>
               </a:rPr>
-              <a:t>PS.  Yes - it's free of any </a:t>
-            </a:r>
-            <a:r>
-              <a:rPr lang="en-US" sz="1600" dirty="0">
-                <a:latin typeface="Baskerville Old Face" panose="02020602080505020303" pitchFamily="18" charset="0"/>
-              </a:rPr>
-              <a:t>minix</a:t>
-            </a:r>
-            <a:r>
-              <a:rPr lang="en-US" sz="1600" dirty="0">
-                <a:latin typeface="Baskerville Old Face" panose="02020602080505020303" pitchFamily="18" charset="0"/>
-              </a:rPr>
-              <a:t> code, and it has a multi-threaded </a:t>
-            </a:r>
-            <a:r>
-              <a:rPr lang="en-US" sz="1600" dirty="0">
-                <a:latin typeface="Baskerville Old Face" panose="02020602080505020303" pitchFamily="18" charset="0"/>
-              </a:rPr>
-              <a:t>fs</a:t>
-            </a:r>
-            <a:r>
-              <a:rPr lang="en-US" sz="1600" dirty="0">
-                <a:latin typeface="Baskerville Old Face" panose="02020602080505020303" pitchFamily="18" charset="0"/>
-              </a:rPr>
-              <a:t>. </a:t>
+              <a:t>PS.  Yes - it's free of any minix code, and it has a multi-threaded fs. </a:t>
             </a:r>
             <a:r>
               <a:rPr lang="en-US" sz="1600" dirty="0" smtClean="0">
@@ -30411,19 +30414,7 @@
               <a:rPr lang="en-US" sz="1600" dirty="0">
                 <a:latin typeface="Baskerville Old Face" panose="02020602080505020303" pitchFamily="18" charset="0"/>
               </a:rPr>
-              <a:t>support anything other than AT-</a:t>
-            </a:r>
-            <a:r>
-              <a:rPr lang="en-US" sz="1600" dirty="0">
-                <a:latin typeface="Baskerville Old Face" panose="02020602080505020303" pitchFamily="18" charset="0"/>
-              </a:rPr>
-              <a:t>harddisks</a:t>
-            </a:r>
-            <a:r>
-              <a:rPr lang="en-US" sz="1600" dirty="0">
-                <a:latin typeface="Baskerville Old Face" panose="02020602080505020303" pitchFamily="18" charset="0"/>
-              </a:rPr>
-              <a:t>, as that's all I have :-(. </a:t>
+              <a:t>support anything other than AT-harddisks, as that's all I have :-(. </a:t>
             </a:r>
           </a:p>
         </p:txBody>
@@ -30972,7 +30963,19 @@
             </a:pPr>
             <a:r>
               <a:rPr lang="en-GB" dirty="0" smtClean="0"/>
-              <a:t>Linus Torvalds was an extremely skilful and knowledgeable programmer.</a:t>
+              <a:t>Linus Torvalds was an extremely </a:t>
+            </a:r>
+            <a:r>
+              <a:rPr lang="en-GB" dirty="0" err="1" smtClean="0"/>
+              <a:t>skillful</a:t>
+            </a:r>
+            <a:r>
+              <a:rPr lang="en-GB" dirty="0" smtClean="0"/>
+              <a:t> </a:t>
+            </a:r>
+            <a:r>
+              <a:rPr lang="en-GB" dirty="0" smtClean="0"/>
+              <a:t>and knowledgeable programmer.</a:t>
             </a:r>
           </a:p>
           <a:p>
@@ -31340,34 +31343,14 @@
             <a:pPr fontAlgn="ctr"/>
             <a:r>
               <a:rPr lang="en-GB" dirty="0" smtClean="0"/>
-              <a:t>Slackware</a:t>
-            </a:r>
-            <a:r>
-              <a:rPr lang="en-GB" dirty="0" smtClean="0"/>
-              <a:t> is the oldest Linux distribution that is still actively developed. It was initially developed by Patrick </a:t>
-            </a:r>
-            <a:r>
-              <a:rPr lang="en-GB" dirty="0" smtClean="0"/>
-              <a:t>Volkering</a:t>
-            </a:r>
-            <a:r>
-              <a:rPr lang="en-GB" dirty="0" smtClean="0"/>
-              <a:t> in 1993.</a:t>
+              <a:t>Slackware is the oldest Linux distribution that is still actively developed. It was initially developed by Patrick Volkering in 1993.</a:t>
             </a:r>
           </a:p>
           <a:p>
             <a:pPr fontAlgn="ctr"/>
             <a:r>
               <a:rPr lang="en-GB" dirty="0" smtClean="0"/>
-              <a:t>Many other distributions most use the GNU </a:t>
-            </a:r>
-            <a:r>
-              <a:rPr lang="en-GB" dirty="0" smtClean="0"/>
-              <a:t>utilities </a:t>
-            </a:r>
-            <a:r>
-              <a:rPr lang="en-GB" dirty="0" smtClean="0"/>
-              <a:t>from the FSF.</a:t>
+              <a:t>Many other distributions most use the GNU utilities from the FSF.</a:t>
             </a:r>
             <a:endParaRPr lang="en-GB" dirty="0"/>
           </a:p>
@@ -33415,11 +33398,7 @@
             <a:pPr algn="ctr"/>
             <a:r>
               <a:rPr lang="en-US" dirty="0" smtClean="0"/>
-              <a:t>System </a:t>
-            </a:r>
-            <a:r>
-              <a:rPr lang="en-US" dirty="0" smtClean="0"/>
-              <a:t>Softwares</a:t>
+              <a:t>System Softwares</a:t>
             </a:r>
             <a:endParaRPr lang="en-US" dirty="0"/>
           </a:p>
@@ -33548,11 +33527,7 @@
             <a:pPr algn="ctr"/>
             <a:r>
               <a:rPr lang="en-US" dirty="0" smtClean="0"/>
-              <a:t>Application </a:t>
-            </a:r>
-            <a:r>
-              <a:rPr lang="en-US" dirty="0" smtClean="0"/>
-              <a:t>Softwares</a:t>
+              <a:t>Application Softwares</a:t>
             </a:r>
             <a:endParaRPr lang="en-US" dirty="0"/>
           </a:p>
@@ -35150,11 +35125,7 @@
             </a:pPr>
             <a:r>
               <a:rPr lang="en-US" sz="2400" dirty="0" smtClean="0"/>
-              <a:t>Input/Output</a:t>
-            </a:r>
-            <a:r>
-              <a:rPr lang="en-US" sz="2400" dirty="0" smtClean="0"/>
-              <a:t> </a:t>
+              <a:t>Input/Output </a:t>
             </a:r>
           </a:p>
           <a:p>
@@ -36247,7 +36218,7 @@
   <a:extraClrSchemeLst/>
   <a:extLst>
     <a:ext uri="{05A4C25C-085E-4340-85A3-A5531E510DB2}">
-      <thm15:themeFamily xmlns="" xmlns:thm15="http://schemas.microsoft.com/office/thememl/2012/main" name="O15_4109default" id="{E728D685-11FC-4812-BA85-57AC6F9C9F40}" vid="{BC4E008B-95FF-4815-904E-143A8EDFC1D4}"/>
+      <thm15:themeFamily xmlns:thm15="http://schemas.microsoft.com/office/thememl/2012/main" xmlns="" name="O15_4109default" id="{E728D685-11FC-4812-BA85-57AC6F9C9F40}" vid="{BC4E008B-95FF-4815-904E-143A8EDFC1D4}"/>
     </a:ext>
   </a:extLst>
 </a:theme>

</xml_diff>